<commit_message>
Configure Powerpoint presentation for individual browsing
</commit_message>
<xml_diff>
--- a/dimensionality_reduction.pptx
+++ b/dimensionality_reduction.pptx
@@ -392,7 +392,7 @@
           <a:p>
             <a:fld id="{FD4ECF9F-6433-47AA-8792-63EFAF83C877}" type="datetimeFigureOut">
               <a:rPr lang="en-US" smtClean="0"/>
-              <a:t>2022-01-25</a:t>
+              <a:t>2022-01-26</a:t>
             </a:fld>
             <a:endParaRPr lang="en-US"/>
           </a:p>
@@ -590,7 +590,7 @@
           <a:p>
             <a:fld id="{FD4ECF9F-6433-47AA-8792-63EFAF83C877}" type="datetimeFigureOut">
               <a:rPr lang="en-US" smtClean="0"/>
-              <a:t>2022-01-25</a:t>
+              <a:t>2022-01-26</a:t>
             </a:fld>
             <a:endParaRPr lang="en-US"/>
           </a:p>
@@ -798,7 +798,7 @@
           <a:p>
             <a:fld id="{FD4ECF9F-6433-47AA-8792-63EFAF83C877}" type="datetimeFigureOut">
               <a:rPr lang="en-US" smtClean="0"/>
-              <a:t>2022-01-25</a:t>
+              <a:t>2022-01-26</a:t>
             </a:fld>
             <a:endParaRPr lang="en-US"/>
           </a:p>
@@ -996,7 +996,7 @@
           <a:p>
             <a:fld id="{FD4ECF9F-6433-47AA-8792-63EFAF83C877}" type="datetimeFigureOut">
               <a:rPr lang="en-US" smtClean="0"/>
-              <a:t>2022-01-25</a:t>
+              <a:t>2022-01-26</a:t>
             </a:fld>
             <a:endParaRPr lang="en-US"/>
           </a:p>
@@ -1271,7 +1271,7 @@
           <a:p>
             <a:fld id="{FD4ECF9F-6433-47AA-8792-63EFAF83C877}" type="datetimeFigureOut">
               <a:rPr lang="en-US" smtClean="0"/>
-              <a:t>2022-01-25</a:t>
+              <a:t>2022-01-26</a:t>
             </a:fld>
             <a:endParaRPr lang="en-US"/>
           </a:p>
@@ -1536,7 +1536,7 @@
           <a:p>
             <a:fld id="{FD4ECF9F-6433-47AA-8792-63EFAF83C877}" type="datetimeFigureOut">
               <a:rPr lang="en-US" smtClean="0"/>
-              <a:t>2022-01-25</a:t>
+              <a:t>2022-01-26</a:t>
             </a:fld>
             <a:endParaRPr lang="en-US"/>
           </a:p>
@@ -1948,7 +1948,7 @@
           <a:p>
             <a:fld id="{FD4ECF9F-6433-47AA-8792-63EFAF83C877}" type="datetimeFigureOut">
               <a:rPr lang="en-US" smtClean="0"/>
-              <a:t>2022-01-25</a:t>
+              <a:t>2022-01-26</a:t>
             </a:fld>
             <a:endParaRPr lang="en-US"/>
           </a:p>
@@ -2089,7 +2089,7 @@
           <a:p>
             <a:fld id="{FD4ECF9F-6433-47AA-8792-63EFAF83C877}" type="datetimeFigureOut">
               <a:rPr lang="en-US" smtClean="0"/>
-              <a:t>2022-01-25</a:t>
+              <a:t>2022-01-26</a:t>
             </a:fld>
             <a:endParaRPr lang="en-US"/>
           </a:p>
@@ -2202,7 +2202,7 @@
           <a:p>
             <a:fld id="{FD4ECF9F-6433-47AA-8792-63EFAF83C877}" type="datetimeFigureOut">
               <a:rPr lang="en-US" smtClean="0"/>
-              <a:t>2022-01-25</a:t>
+              <a:t>2022-01-26</a:t>
             </a:fld>
             <a:endParaRPr lang="en-US"/>
           </a:p>
@@ -2513,7 +2513,7 @@
           <a:p>
             <a:fld id="{FD4ECF9F-6433-47AA-8792-63EFAF83C877}" type="datetimeFigureOut">
               <a:rPr lang="en-US" smtClean="0"/>
-              <a:t>2022-01-25</a:t>
+              <a:t>2022-01-26</a:t>
             </a:fld>
             <a:endParaRPr lang="en-US"/>
           </a:p>
@@ -2801,7 +2801,7 @@
           <a:p>
             <a:fld id="{FD4ECF9F-6433-47AA-8792-63EFAF83C877}" type="datetimeFigureOut">
               <a:rPr lang="en-US" smtClean="0"/>
-              <a:t>2022-01-25</a:t>
+              <a:t>2022-01-26</a:t>
             </a:fld>
             <a:endParaRPr lang="en-US"/>
           </a:p>
@@ -3042,7 +3042,7 @@
           <a:p>
             <a:fld id="{FD4ECF9F-6433-47AA-8792-63EFAF83C877}" type="datetimeFigureOut">
               <a:rPr lang="en-US" smtClean="0"/>
-              <a:t>2022-01-25</a:t>
+              <a:t>2022-01-26</a:t>
             </a:fld>
             <a:endParaRPr lang="en-US"/>
           </a:p>
@@ -12332,8 +12332,8 @@
           </a:p>
         </p:txBody>
       </p:sp>
-      <mc:AlternateContent xmlns:mc="http://schemas.openxmlformats.org/markup-compatibility/2006">
-        <mc:Choice xmlns:a14="http://schemas.microsoft.com/office/drawing/2010/main" Requires="a14">
+      <mc:AlternateContent xmlns:mc="http://schemas.openxmlformats.org/markup-compatibility/2006" xmlns:a14="http://schemas.microsoft.com/office/drawing/2010/main">
+        <mc:Choice Requires="a14">
           <p:sp>
             <p:nvSpPr>
               <p:cNvPr id="5" name="TextBox 4">
@@ -12362,6 +12362,7 @@
               </a:bodyPr>
               <a:lstStyle/>
               <a:p>
+                <a:pPr/>
                 <a14:m>
                   <m:oMathPara xmlns:m="http://schemas.openxmlformats.org/officeDocument/2006/math">
                     <m:oMathParaPr>
@@ -12803,7 +12804,7 @@
             </p:txBody>
           </p:sp>
         </mc:Choice>
-        <mc:Fallback>
+        <mc:Fallback xmlns="">
           <p:sp>
             <p:nvSpPr>
               <p:cNvPr id="5" name="TextBox 4">
@@ -12848,8 +12849,8 @@
           </p:sp>
         </mc:Fallback>
       </mc:AlternateContent>
-      <mc:AlternateContent xmlns:mc="http://schemas.openxmlformats.org/markup-compatibility/2006">
-        <mc:Choice xmlns:a14="http://schemas.microsoft.com/office/drawing/2010/main" Requires="a14">
+      <mc:AlternateContent xmlns:mc="http://schemas.openxmlformats.org/markup-compatibility/2006" xmlns:a14="http://schemas.microsoft.com/office/drawing/2010/main">
+        <mc:Choice Requires="a14">
           <p:sp>
             <p:nvSpPr>
               <p:cNvPr id="6" name="TextBox 5">
@@ -12878,6 +12879,7 @@
               </a:bodyPr>
               <a:lstStyle/>
               <a:p>
+                <a:pPr/>
                 <a14:m>
                   <m:oMathPara xmlns:m="http://schemas.openxmlformats.org/officeDocument/2006/math">
                     <m:oMathParaPr>
@@ -13260,7 +13262,7 @@
             </p:txBody>
           </p:sp>
         </mc:Choice>
-        <mc:Fallback>
+        <mc:Fallback xmlns="">
           <p:sp>
             <p:nvSpPr>
               <p:cNvPr id="6" name="TextBox 5">
@@ -13305,8 +13307,8 @@
           </p:sp>
         </mc:Fallback>
       </mc:AlternateContent>
-      <mc:AlternateContent xmlns:mc="http://schemas.openxmlformats.org/markup-compatibility/2006">
-        <mc:Choice xmlns:a14="http://schemas.microsoft.com/office/drawing/2010/main" Requires="a14">
+      <mc:AlternateContent xmlns:mc="http://schemas.openxmlformats.org/markup-compatibility/2006" xmlns:a14="http://schemas.microsoft.com/office/drawing/2010/main">
+        <mc:Choice Requires="a14">
           <p:sp>
             <p:nvSpPr>
               <p:cNvPr id="7" name="TextBox 6">
@@ -13335,6 +13337,7 @@
               </a:bodyPr>
               <a:lstStyle/>
               <a:p>
+                <a:pPr/>
                 <a14:m>
                   <m:oMathPara xmlns:m="http://schemas.openxmlformats.org/officeDocument/2006/math">
                     <m:oMathParaPr>
@@ -13537,7 +13540,7 @@
             </p:txBody>
           </p:sp>
         </mc:Choice>
-        <mc:Fallback>
+        <mc:Fallback xmlns="">
           <p:sp>
             <p:nvSpPr>
               <p:cNvPr id="7" name="TextBox 6">

</xml_diff>

<commit_message>
Add slides on UMAP
</commit_message>
<xml_diff>
--- a/dimensionality_reduction.pptx
+++ b/dimensionality_reduction.pptx
@@ -19,6 +19,11 @@
     <p:sldId id="267" r:id="rId13"/>
     <p:sldId id="268" r:id="rId14"/>
     <p:sldId id="269" r:id="rId15"/>
+    <p:sldId id="270" r:id="rId16"/>
+    <p:sldId id="271" r:id="rId17"/>
+    <p:sldId id="272" r:id="rId18"/>
+    <p:sldId id="273" r:id="rId19"/>
+    <p:sldId id="274" r:id="rId20"/>
   </p:sldIdLst>
   <p:sldSz cx="12192000" cy="6858000"/>
   <p:notesSz cx="6858000" cy="9144000"/>
@@ -398,7 +403,7 @@
           <a:p>
             <a:fld id="{FD4ECF9F-6433-47AA-8792-63EFAF83C877}" type="datetimeFigureOut">
               <a:rPr lang="en-US" smtClean="0"/>
-              <a:t>2022-02-12</a:t>
+              <a:t>2022-02-17</a:t>
             </a:fld>
             <a:endParaRPr lang="en-US"/>
           </a:p>
@@ -596,7 +601,7 @@
           <a:p>
             <a:fld id="{FD4ECF9F-6433-47AA-8792-63EFAF83C877}" type="datetimeFigureOut">
               <a:rPr lang="en-US" smtClean="0"/>
-              <a:t>2022-02-12</a:t>
+              <a:t>2022-02-17</a:t>
             </a:fld>
             <a:endParaRPr lang="en-US"/>
           </a:p>
@@ -804,7 +809,7 @@
           <a:p>
             <a:fld id="{FD4ECF9F-6433-47AA-8792-63EFAF83C877}" type="datetimeFigureOut">
               <a:rPr lang="en-US" smtClean="0"/>
-              <a:t>2022-02-12</a:t>
+              <a:t>2022-02-17</a:t>
             </a:fld>
             <a:endParaRPr lang="en-US"/>
           </a:p>
@@ -1002,7 +1007,7 @@
           <a:p>
             <a:fld id="{FD4ECF9F-6433-47AA-8792-63EFAF83C877}" type="datetimeFigureOut">
               <a:rPr lang="en-US" smtClean="0"/>
-              <a:t>2022-02-12</a:t>
+              <a:t>2022-02-17</a:t>
             </a:fld>
             <a:endParaRPr lang="en-US"/>
           </a:p>
@@ -1277,7 +1282,7 @@
           <a:p>
             <a:fld id="{FD4ECF9F-6433-47AA-8792-63EFAF83C877}" type="datetimeFigureOut">
               <a:rPr lang="en-US" smtClean="0"/>
-              <a:t>2022-02-12</a:t>
+              <a:t>2022-02-17</a:t>
             </a:fld>
             <a:endParaRPr lang="en-US"/>
           </a:p>
@@ -1542,7 +1547,7 @@
           <a:p>
             <a:fld id="{FD4ECF9F-6433-47AA-8792-63EFAF83C877}" type="datetimeFigureOut">
               <a:rPr lang="en-US" smtClean="0"/>
-              <a:t>2022-02-12</a:t>
+              <a:t>2022-02-17</a:t>
             </a:fld>
             <a:endParaRPr lang="en-US"/>
           </a:p>
@@ -1954,7 +1959,7 @@
           <a:p>
             <a:fld id="{FD4ECF9F-6433-47AA-8792-63EFAF83C877}" type="datetimeFigureOut">
               <a:rPr lang="en-US" smtClean="0"/>
-              <a:t>2022-02-12</a:t>
+              <a:t>2022-02-17</a:t>
             </a:fld>
             <a:endParaRPr lang="en-US"/>
           </a:p>
@@ -2095,7 +2100,7 @@
           <a:p>
             <a:fld id="{FD4ECF9F-6433-47AA-8792-63EFAF83C877}" type="datetimeFigureOut">
               <a:rPr lang="en-US" smtClean="0"/>
-              <a:t>2022-02-12</a:t>
+              <a:t>2022-02-17</a:t>
             </a:fld>
             <a:endParaRPr lang="en-US"/>
           </a:p>
@@ -2208,7 +2213,7 @@
           <a:p>
             <a:fld id="{FD4ECF9F-6433-47AA-8792-63EFAF83C877}" type="datetimeFigureOut">
               <a:rPr lang="en-US" smtClean="0"/>
-              <a:t>2022-02-12</a:t>
+              <a:t>2022-02-17</a:t>
             </a:fld>
             <a:endParaRPr lang="en-US"/>
           </a:p>
@@ -2519,7 +2524,7 @@
           <a:p>
             <a:fld id="{FD4ECF9F-6433-47AA-8792-63EFAF83C877}" type="datetimeFigureOut">
               <a:rPr lang="en-US" smtClean="0"/>
-              <a:t>2022-02-12</a:t>
+              <a:t>2022-02-17</a:t>
             </a:fld>
             <a:endParaRPr lang="en-US"/>
           </a:p>
@@ -2807,7 +2812,7 @@
           <a:p>
             <a:fld id="{FD4ECF9F-6433-47AA-8792-63EFAF83C877}" type="datetimeFigureOut">
               <a:rPr lang="en-US" smtClean="0"/>
-              <a:t>2022-02-12</a:t>
+              <a:t>2022-02-17</a:t>
             </a:fld>
             <a:endParaRPr lang="en-US"/>
           </a:p>
@@ -3048,7 +3053,7 @@
           <a:p>
             <a:fld id="{FD4ECF9F-6433-47AA-8792-63EFAF83C877}" type="datetimeFigureOut">
               <a:rPr lang="en-US" smtClean="0"/>
-              <a:t>2022-02-12</a:t>
+              <a:t>2022-02-17</a:t>
             </a:fld>
             <a:endParaRPr lang="en-US"/>
           </a:p>
@@ -7521,6 +7526,1412 @@
   <p:clrMapOvr>
     <a:masterClrMapping/>
   </p:clrMapOvr>
+</p:sld>
+</file>
+
+<file path=ppt/slides/slide15.xml><?xml version="1.0" encoding="utf-8"?>
+<p:sld xmlns:a="http://schemas.openxmlformats.org/drawingml/2006/main" xmlns:r="http://schemas.openxmlformats.org/officeDocument/2006/relationships" xmlns:p="http://schemas.openxmlformats.org/presentationml/2006/main">
+  <p:cSld>
+    <p:spTree>
+      <p:nvGrpSpPr>
+        <p:cNvPr id="1" name=""/>
+        <p:cNvGrpSpPr/>
+        <p:nvPr/>
+      </p:nvGrpSpPr>
+      <p:grpSpPr>
+        <a:xfrm>
+          <a:off x="0" y="0"/>
+          <a:ext cx="0" cy="0"/>
+          <a:chOff x="0" y="0"/>
+          <a:chExt cx="0" cy="0"/>
+        </a:xfrm>
+      </p:grpSpPr>
+      <p:sp>
+        <p:nvSpPr>
+          <p:cNvPr id="2" name="Title 1">
+            <a:extLst>
+              <a:ext uri="{FF2B5EF4-FFF2-40B4-BE49-F238E27FC236}">
+                <a16:creationId xmlns:a16="http://schemas.microsoft.com/office/drawing/2014/main" id="{D02F6F99-B77A-4229-809A-2521D66ABDDB}"/>
+              </a:ext>
+            </a:extLst>
+          </p:cNvPr>
+          <p:cNvSpPr>
+            <a:spLocks noGrp="1"/>
+          </p:cNvSpPr>
+          <p:nvPr>
+            <p:ph type="title"/>
+          </p:nvPr>
+        </p:nvSpPr>
+        <p:spPr/>
+        <p:txBody>
+          <a:bodyPr/>
+          <a:lstStyle/>
+          <a:p>
+            <a:r>
+              <a:rPr lang="en-US" dirty="0"/>
+              <a:t>Local metrics</a:t>
+            </a:r>
+          </a:p>
+        </p:txBody>
+      </p:sp>
+      <p:pic>
+        <p:nvPicPr>
+          <p:cNvPr id="1026" name="Picture 2" descr="Open balls of radius one with a locally varying metric">
+            <a:extLst>
+              <a:ext uri="{FF2B5EF4-FFF2-40B4-BE49-F238E27FC236}">
+                <a16:creationId xmlns:a16="http://schemas.microsoft.com/office/drawing/2014/main" id="{0970ABC0-1146-47C6-BE3F-768ACADA9D1F}"/>
+              </a:ext>
+            </a:extLst>
+          </p:cNvPr>
+          <p:cNvPicPr>
+            <a:picLocks noChangeAspect="1" noChangeArrowheads="1"/>
+          </p:cNvPicPr>
+          <p:nvPr/>
+        </p:nvPicPr>
+        <p:blipFill>
+          <a:blip r:embed="rId2">
+            <a:extLst>
+              <a:ext uri="{28A0092B-C50C-407E-A947-70E740481C1C}">
+                <a14:useLocalDpi xmlns:a14="http://schemas.microsoft.com/office/drawing/2010/main" val="0"/>
+              </a:ext>
+            </a:extLst>
+          </a:blip>
+          <a:srcRect/>
+          <a:stretch>
+            <a:fillRect/>
+          </a:stretch>
+        </p:blipFill>
+        <p:spPr bwMode="auto">
+          <a:xfrm>
+            <a:off x="2843213" y="1562100"/>
+            <a:ext cx="6505575" cy="3733800"/>
+          </a:xfrm>
+          <a:prstGeom prst="rect">
+            <a:avLst/>
+          </a:prstGeom>
+          <a:noFill/>
+          <a:extLst>
+            <a:ext uri="{909E8E84-426E-40DD-AFC4-6F175D3DCCD1}">
+              <a14:hiddenFill xmlns:a14="http://schemas.microsoft.com/office/drawing/2010/main">
+                <a:solidFill>
+                  <a:srgbClr val="FFFFFF"/>
+                </a:solidFill>
+              </a14:hiddenFill>
+            </a:ext>
+          </a:extLst>
+        </p:spPr>
+      </p:pic>
+      <p:sp>
+        <p:nvSpPr>
+          <p:cNvPr id="4" name="TextBox 3">
+            <a:extLst>
+              <a:ext uri="{FF2B5EF4-FFF2-40B4-BE49-F238E27FC236}">
+                <a16:creationId xmlns:a16="http://schemas.microsoft.com/office/drawing/2014/main" id="{5BBD7D95-6498-442F-A6A2-3E24E8E29A0B}"/>
+              </a:ext>
+            </a:extLst>
+          </p:cNvPr>
+          <p:cNvSpPr txBox="1"/>
+          <p:nvPr/>
+        </p:nvSpPr>
+        <p:spPr>
+          <a:xfrm>
+            <a:off x="3459637" y="5740924"/>
+            <a:ext cx="6312562" cy="369332"/>
+          </a:xfrm>
+          <a:prstGeom prst="rect">
+            <a:avLst/>
+          </a:prstGeom>
+          <a:noFill/>
+          <a:ln>
+            <a:solidFill>
+              <a:schemeClr val="tx1"/>
+            </a:solidFill>
+          </a:ln>
+        </p:spPr>
+        <p:txBody>
+          <a:bodyPr wrap="none" rtlCol="0">
+            <a:spAutoFit/>
+          </a:bodyPr>
+          <a:lstStyle/>
+          <a:p>
+            <a:r>
+              <a:rPr lang="en-US" dirty="0"/>
+              <a:t>Local geometry/metric: sphere extends to </a:t>
+            </a:r>
+            <a:r>
+              <a:rPr lang="en-US" i="1" dirty="0"/>
+              <a:t>n</a:t>
+            </a:r>
+            <a:r>
+              <a:rPr lang="en-US" dirty="0"/>
+              <a:t>-</a:t>
+            </a:r>
+            <a:r>
+              <a:rPr lang="en-US" dirty="0" err="1"/>
+              <a:t>th</a:t>
+            </a:r>
+            <a:r>
+              <a:rPr lang="en-US" dirty="0"/>
+              <a:t> nearest </a:t>
+            </a:r>
+            <a:r>
+              <a:rPr lang="en-US" dirty="0" err="1"/>
+              <a:t>neighbout</a:t>
+            </a:r>
+            <a:endParaRPr lang="en-US" dirty="0"/>
+          </a:p>
+        </p:txBody>
+      </p:sp>
+      <p:sp>
+        <p:nvSpPr>
+          <p:cNvPr id="3" name="TextBox 2">
+            <a:extLst>
+              <a:ext uri="{FF2B5EF4-FFF2-40B4-BE49-F238E27FC236}">
+                <a16:creationId xmlns:a16="http://schemas.microsoft.com/office/drawing/2014/main" id="{2CCA159B-6BC4-44B3-B3DC-85EF27F58ABF}"/>
+              </a:ext>
+            </a:extLst>
+          </p:cNvPr>
+          <p:cNvSpPr txBox="1"/>
+          <p:nvPr/>
+        </p:nvSpPr>
+        <p:spPr>
+          <a:xfrm>
+            <a:off x="923026" y="6308209"/>
+            <a:ext cx="3417987" cy="369332"/>
+          </a:xfrm>
+          <a:prstGeom prst="rect">
+            <a:avLst/>
+          </a:prstGeom>
+          <a:noFill/>
+          <a:ln>
+            <a:solidFill>
+              <a:schemeClr val="tx1"/>
+            </a:solidFill>
+          </a:ln>
+        </p:spPr>
+        <p:txBody>
+          <a:bodyPr wrap="none" rtlCol="0">
+            <a:spAutoFit/>
+          </a:bodyPr>
+          <a:lstStyle/>
+          <a:p>
+            <a:r>
+              <a:rPr lang="en-US" dirty="0" err="1">
+                <a:latin typeface="Courier New" panose="02070309020205020404" pitchFamily="49" charset="0"/>
+                <a:cs typeface="Courier New" panose="02070309020205020404" pitchFamily="49" charset="0"/>
+              </a:rPr>
+              <a:t>n_neighbours</a:t>
+            </a:r>
+            <a:r>
+              <a:rPr lang="en-US" dirty="0"/>
+              <a:t> hyperparameter</a:t>
+            </a:r>
+          </a:p>
+        </p:txBody>
+      </p:sp>
+    </p:spTree>
+    <p:extLst>
+      <p:ext uri="{BB962C8B-B14F-4D97-AF65-F5344CB8AC3E}">
+        <p14:creationId xmlns:p14="http://schemas.microsoft.com/office/powerpoint/2010/main" val="2794569241"/>
+      </p:ext>
+    </p:extLst>
+  </p:cSld>
+  <p:clrMapOvr>
+    <a:masterClrMapping/>
+  </p:clrMapOvr>
+  <p:timing>
+    <p:tnLst>
+      <p:par>
+        <p:cTn id="1" dur="indefinite" restart="never" nodeType="tmRoot">
+          <p:childTnLst>
+            <p:seq concurrent="1" nextAc="seek">
+              <p:cTn id="2" dur="indefinite" nodeType="mainSeq">
+                <p:childTnLst>
+                  <p:par>
+                    <p:cTn id="3" fill="hold">
+                      <p:stCondLst>
+                        <p:cond delay="indefinite"/>
+                      </p:stCondLst>
+                      <p:childTnLst>
+                        <p:par>
+                          <p:cTn id="4" fill="hold">
+                            <p:stCondLst>
+                              <p:cond delay="0"/>
+                            </p:stCondLst>
+                            <p:childTnLst>
+                              <p:par>
+                                <p:cTn id="5" presetID="1" presetClass="entr" presetSubtype="0" fill="hold" grpId="0" nodeType="clickEffect">
+                                  <p:stCondLst>
+                                    <p:cond delay="0"/>
+                                  </p:stCondLst>
+                                  <p:childTnLst>
+                                    <p:set>
+                                      <p:cBhvr>
+                                        <p:cTn id="6" dur="1" fill="hold">
+                                          <p:stCondLst>
+                                            <p:cond delay="0"/>
+                                          </p:stCondLst>
+                                        </p:cTn>
+                                        <p:tgtEl>
+                                          <p:spTgt spid="3"/>
+                                        </p:tgtEl>
+                                        <p:attrNameLst>
+                                          <p:attrName>style.visibility</p:attrName>
+                                        </p:attrNameLst>
+                                      </p:cBhvr>
+                                      <p:to>
+                                        <p:strVal val="visible"/>
+                                      </p:to>
+                                    </p:set>
+                                  </p:childTnLst>
+                                </p:cTn>
+                              </p:par>
+                            </p:childTnLst>
+                          </p:cTn>
+                        </p:par>
+                      </p:childTnLst>
+                    </p:cTn>
+                  </p:par>
+                </p:childTnLst>
+              </p:cTn>
+              <p:prevCondLst>
+                <p:cond evt="onPrev" delay="0">
+                  <p:tgtEl>
+                    <p:sldTgt/>
+                  </p:tgtEl>
+                </p:cond>
+              </p:prevCondLst>
+              <p:nextCondLst>
+                <p:cond evt="onNext" delay="0">
+                  <p:tgtEl>
+                    <p:sldTgt/>
+                  </p:tgtEl>
+                </p:cond>
+              </p:nextCondLst>
+            </p:seq>
+          </p:childTnLst>
+        </p:cTn>
+      </p:par>
+    </p:tnLst>
+    <p:bldLst>
+      <p:bldP spid="3" grpId="0" animBg="1"/>
+    </p:bldLst>
+  </p:timing>
+</p:sld>
+</file>
+
+<file path=ppt/slides/slide16.xml><?xml version="1.0" encoding="utf-8"?>
+<p:sld xmlns:a="http://schemas.openxmlformats.org/drawingml/2006/main" xmlns:r="http://schemas.openxmlformats.org/officeDocument/2006/relationships" xmlns:p="http://schemas.openxmlformats.org/presentationml/2006/main">
+  <p:cSld>
+    <p:spTree>
+      <p:nvGrpSpPr>
+        <p:cNvPr id="1" name=""/>
+        <p:cNvGrpSpPr/>
+        <p:nvPr/>
+      </p:nvGrpSpPr>
+      <p:grpSpPr>
+        <a:xfrm>
+          <a:off x="0" y="0"/>
+          <a:ext cx="0" cy="0"/>
+          <a:chOff x="0" y="0"/>
+          <a:chExt cx="0" cy="0"/>
+        </a:xfrm>
+      </p:grpSpPr>
+      <p:sp>
+        <p:nvSpPr>
+          <p:cNvPr id="2" name="Title 1">
+            <a:extLst>
+              <a:ext uri="{FF2B5EF4-FFF2-40B4-BE49-F238E27FC236}">
+                <a16:creationId xmlns:a16="http://schemas.microsoft.com/office/drawing/2014/main" id="{17B2D57D-924F-40D6-B94C-8A98D2BA41A7}"/>
+              </a:ext>
+            </a:extLst>
+          </p:cNvPr>
+          <p:cNvSpPr>
+            <a:spLocks noGrp="1"/>
+          </p:cNvSpPr>
+          <p:nvPr>
+            <p:ph type="title"/>
+          </p:nvPr>
+        </p:nvSpPr>
+        <p:spPr/>
+        <p:txBody>
+          <a:bodyPr/>
+          <a:lstStyle/>
+          <a:p>
+            <a:r>
+              <a:rPr lang="en-US" dirty="0"/>
+              <a:t>Curse of dimensionality</a:t>
+            </a:r>
+          </a:p>
+        </p:txBody>
+      </p:sp>
+      <p:pic>
+        <p:nvPicPr>
+          <p:cNvPr id="2050" name="Picture 2" descr="Local connectivity and fuzzy open sets">
+            <a:extLst>
+              <a:ext uri="{FF2B5EF4-FFF2-40B4-BE49-F238E27FC236}">
+                <a16:creationId xmlns:a16="http://schemas.microsoft.com/office/drawing/2014/main" id="{AD6BB573-01CB-448B-BB3D-AAB9993EAF3A}"/>
+              </a:ext>
+            </a:extLst>
+          </p:cNvPr>
+          <p:cNvPicPr>
+            <a:picLocks noChangeAspect="1" noChangeArrowheads="1"/>
+          </p:cNvPicPr>
+          <p:nvPr/>
+        </p:nvPicPr>
+        <p:blipFill>
+          <a:blip r:embed="rId2">
+            <a:extLst>
+              <a:ext uri="{28A0092B-C50C-407E-A947-70E740481C1C}">
+                <a14:useLocalDpi xmlns:a14="http://schemas.microsoft.com/office/drawing/2010/main" val="0"/>
+              </a:ext>
+            </a:extLst>
+          </a:blip>
+          <a:srcRect/>
+          <a:stretch>
+            <a:fillRect/>
+          </a:stretch>
+        </p:blipFill>
+        <p:spPr bwMode="auto">
+          <a:xfrm>
+            <a:off x="2843213" y="1562100"/>
+            <a:ext cx="6505575" cy="3733800"/>
+          </a:xfrm>
+          <a:prstGeom prst="rect">
+            <a:avLst/>
+          </a:prstGeom>
+          <a:noFill/>
+          <a:extLst>
+            <a:ext uri="{909E8E84-426E-40DD-AFC4-6F175D3DCCD1}">
+              <a14:hiddenFill xmlns:a14="http://schemas.microsoft.com/office/drawing/2010/main">
+                <a:solidFill>
+                  <a:srgbClr val="FFFFFF"/>
+                </a:solidFill>
+              </a14:hiddenFill>
+            </a:ext>
+          </a:extLst>
+        </p:spPr>
+      </p:pic>
+      <p:sp>
+        <p:nvSpPr>
+          <p:cNvPr id="3" name="TextBox 2">
+            <a:extLst>
+              <a:ext uri="{FF2B5EF4-FFF2-40B4-BE49-F238E27FC236}">
+                <a16:creationId xmlns:a16="http://schemas.microsoft.com/office/drawing/2014/main" id="{7F664E42-7B4C-435D-88FE-512BEF9E72B7}"/>
+              </a:ext>
+            </a:extLst>
+          </p:cNvPr>
+          <p:cNvSpPr txBox="1"/>
+          <p:nvPr/>
+        </p:nvSpPr>
+        <p:spPr>
+          <a:xfrm>
+            <a:off x="629729" y="2329132"/>
+            <a:ext cx="1940944" cy="923330"/>
+          </a:xfrm>
+          <a:prstGeom prst="rect">
+            <a:avLst/>
+          </a:prstGeom>
+          <a:noFill/>
+        </p:spPr>
+        <p:txBody>
+          <a:bodyPr wrap="square" rtlCol="0">
+            <a:spAutoFit/>
+          </a:bodyPr>
+          <a:lstStyle/>
+          <a:p>
+            <a:r>
+              <a:rPr lang="en-US" dirty="0"/>
+              <a:t>Distances in high-dimensional spaces are similar</a:t>
+            </a:r>
+          </a:p>
+        </p:txBody>
+      </p:sp>
+      <p:sp>
+        <p:nvSpPr>
+          <p:cNvPr id="5" name="TextBox 4">
+            <a:extLst>
+              <a:ext uri="{FF2B5EF4-FFF2-40B4-BE49-F238E27FC236}">
+                <a16:creationId xmlns:a16="http://schemas.microsoft.com/office/drawing/2014/main" id="{D0E126F3-53B8-427D-A592-FD7345011212}"/>
+              </a:ext>
+            </a:extLst>
+          </p:cNvPr>
+          <p:cNvSpPr txBox="1"/>
+          <p:nvPr/>
+        </p:nvSpPr>
+        <p:spPr>
+          <a:xfrm>
+            <a:off x="3459637" y="5740924"/>
+            <a:ext cx="3530903" cy="369332"/>
+          </a:xfrm>
+          <a:prstGeom prst="rect">
+            <a:avLst/>
+          </a:prstGeom>
+          <a:noFill/>
+          <a:ln>
+            <a:solidFill>
+              <a:schemeClr val="tx1"/>
+            </a:solidFill>
+          </a:ln>
+        </p:spPr>
+        <p:txBody>
+          <a:bodyPr wrap="none" rtlCol="0">
+            <a:spAutoFit/>
+          </a:bodyPr>
+          <a:lstStyle/>
+          <a:p>
+            <a:r>
+              <a:rPr lang="en-US" dirty="0"/>
+              <a:t>Relax to connected components &gt; 1</a:t>
+            </a:r>
+          </a:p>
+        </p:txBody>
+      </p:sp>
+    </p:spTree>
+    <p:extLst>
+      <p:ext uri="{BB962C8B-B14F-4D97-AF65-F5344CB8AC3E}">
+        <p14:creationId xmlns:p14="http://schemas.microsoft.com/office/powerpoint/2010/main" val="4267399799"/>
+      </p:ext>
+    </p:extLst>
+  </p:cSld>
+  <p:clrMapOvr>
+    <a:masterClrMapping/>
+  </p:clrMapOvr>
+</p:sld>
+</file>
+
+<file path=ppt/slides/slide17.xml><?xml version="1.0" encoding="utf-8"?>
+<p:sld xmlns:a="http://schemas.openxmlformats.org/drawingml/2006/main" xmlns:r="http://schemas.openxmlformats.org/officeDocument/2006/relationships" xmlns:p="http://schemas.openxmlformats.org/presentationml/2006/main">
+  <p:cSld>
+    <p:spTree>
+      <p:nvGrpSpPr>
+        <p:cNvPr id="1" name=""/>
+        <p:cNvGrpSpPr/>
+        <p:nvPr/>
+      </p:nvGrpSpPr>
+      <p:grpSpPr>
+        <a:xfrm>
+          <a:off x="0" y="0"/>
+          <a:ext cx="0" cy="0"/>
+          <a:chOff x="0" y="0"/>
+          <a:chExt cx="0" cy="0"/>
+        </a:xfrm>
+      </p:grpSpPr>
+      <p:sp>
+        <p:nvSpPr>
+          <p:cNvPr id="2" name="Title 1">
+            <a:extLst>
+              <a:ext uri="{FF2B5EF4-FFF2-40B4-BE49-F238E27FC236}">
+                <a16:creationId xmlns:a16="http://schemas.microsoft.com/office/drawing/2014/main" id="{9D563B0E-59EA-496B-A14B-80B7399EED3F}"/>
+              </a:ext>
+            </a:extLst>
+          </p:cNvPr>
+          <p:cNvSpPr>
+            <a:spLocks noGrp="1"/>
+          </p:cNvSpPr>
+          <p:nvPr>
+            <p:ph type="title"/>
+          </p:nvPr>
+        </p:nvSpPr>
+        <p:spPr/>
+        <p:txBody>
+          <a:bodyPr/>
+          <a:lstStyle/>
+          <a:p>
+            <a:r>
+              <a:rPr lang="en-US" dirty="0"/>
+              <a:t>Disagreeing metrics</a:t>
+            </a:r>
+          </a:p>
+        </p:txBody>
+      </p:sp>
+      <p:pic>
+        <p:nvPicPr>
+          <p:cNvPr id="3074" name="Picture 2" descr="Edges with incompatible weights">
+            <a:extLst>
+              <a:ext uri="{FF2B5EF4-FFF2-40B4-BE49-F238E27FC236}">
+                <a16:creationId xmlns:a16="http://schemas.microsoft.com/office/drawing/2014/main" id="{7FACF035-ED99-4030-9E00-8321CB306904}"/>
+              </a:ext>
+            </a:extLst>
+          </p:cNvPr>
+          <p:cNvPicPr>
+            <a:picLocks noChangeAspect="1" noChangeArrowheads="1"/>
+          </p:cNvPicPr>
+          <p:nvPr/>
+        </p:nvPicPr>
+        <p:blipFill>
+          <a:blip r:embed="rId2">
+            <a:extLst>
+              <a:ext uri="{28A0092B-C50C-407E-A947-70E740481C1C}">
+                <a14:useLocalDpi xmlns:a14="http://schemas.microsoft.com/office/drawing/2010/main" val="0"/>
+              </a:ext>
+            </a:extLst>
+          </a:blip>
+          <a:srcRect/>
+          <a:stretch>
+            <a:fillRect/>
+          </a:stretch>
+        </p:blipFill>
+        <p:spPr bwMode="auto">
+          <a:xfrm>
+            <a:off x="2843213" y="1562100"/>
+            <a:ext cx="6505575" cy="3733800"/>
+          </a:xfrm>
+          <a:prstGeom prst="rect">
+            <a:avLst/>
+          </a:prstGeom>
+          <a:noFill/>
+          <a:extLst>
+            <a:ext uri="{909E8E84-426E-40DD-AFC4-6F175D3DCCD1}">
+              <a14:hiddenFill xmlns:a14="http://schemas.microsoft.com/office/drawing/2010/main">
+                <a:solidFill>
+                  <a:srgbClr val="FFFFFF"/>
+                </a:solidFill>
+              </a14:hiddenFill>
+            </a:ext>
+          </a:extLst>
+        </p:spPr>
+      </p:pic>
+      <p:grpSp>
+        <p:nvGrpSpPr>
+          <p:cNvPr id="7" name="Group 6">
+            <a:extLst>
+              <a:ext uri="{FF2B5EF4-FFF2-40B4-BE49-F238E27FC236}">
+                <a16:creationId xmlns:a16="http://schemas.microsoft.com/office/drawing/2014/main" id="{057D252E-AD82-432E-A5A8-FECDACA10C74}"/>
+              </a:ext>
+            </a:extLst>
+          </p:cNvPr>
+          <p:cNvGrpSpPr/>
+          <p:nvPr/>
+        </p:nvGrpSpPr>
+        <p:grpSpPr>
+          <a:xfrm>
+            <a:off x="5477773" y="3429000"/>
+            <a:ext cx="618227" cy="369332"/>
+            <a:chOff x="5477773" y="3429000"/>
+            <a:chExt cx="618227" cy="369332"/>
+          </a:xfrm>
+        </p:grpSpPr>
+        <p:sp>
+          <p:nvSpPr>
+            <p:cNvPr id="3" name="TextBox 2">
+              <a:extLst>
+                <a:ext uri="{FF2B5EF4-FFF2-40B4-BE49-F238E27FC236}">
+                  <a16:creationId xmlns:a16="http://schemas.microsoft.com/office/drawing/2014/main" id="{3ED15CD2-D0F3-4610-85F8-FD3FFABBAF31}"/>
+                </a:ext>
+              </a:extLst>
+            </p:cNvPr>
+            <p:cNvSpPr txBox="1"/>
+            <p:nvPr/>
+          </p:nvSpPr>
+          <p:spPr>
+            <a:xfrm>
+              <a:off x="5477773" y="3429000"/>
+              <a:ext cx="303288" cy="369332"/>
+            </a:xfrm>
+            <a:prstGeom prst="rect">
+              <a:avLst/>
+            </a:prstGeom>
+            <a:noFill/>
+          </p:spPr>
+          <p:txBody>
+            <a:bodyPr wrap="none" rtlCol="0">
+              <a:spAutoFit/>
+            </a:bodyPr>
+            <a:lstStyle/>
+            <a:p>
+              <a:r>
+                <a:rPr lang="en-US" i="1" dirty="0"/>
+                <a:t>a</a:t>
+              </a:r>
+            </a:p>
+          </p:txBody>
+        </p:sp>
+        <p:cxnSp>
+          <p:nvCxnSpPr>
+            <p:cNvPr id="5" name="Straight Arrow Connector 4">
+              <a:extLst>
+                <a:ext uri="{FF2B5EF4-FFF2-40B4-BE49-F238E27FC236}">
+                  <a16:creationId xmlns:a16="http://schemas.microsoft.com/office/drawing/2014/main" id="{924E5E89-95FE-4ED1-BA9D-ECA3B9654E10}"/>
+                </a:ext>
+              </a:extLst>
+            </p:cNvPr>
+            <p:cNvCxnSpPr>
+              <a:cxnSpLocks/>
+              <a:stCxn id="3" idx="3"/>
+            </p:cNvCxnSpPr>
+            <p:nvPr/>
+          </p:nvCxnSpPr>
+          <p:spPr>
+            <a:xfrm>
+              <a:off x="5781061" y="3613666"/>
+              <a:ext cx="314939" cy="0"/>
+            </a:xfrm>
+            <a:prstGeom prst="straightConnector1">
+              <a:avLst/>
+            </a:prstGeom>
+            <a:ln>
+              <a:solidFill>
+                <a:schemeClr val="tx1"/>
+              </a:solidFill>
+              <a:tailEnd type="stealth"/>
+            </a:ln>
+          </p:spPr>
+          <p:style>
+            <a:lnRef idx="1">
+              <a:schemeClr val="accent1"/>
+            </a:lnRef>
+            <a:fillRef idx="0">
+              <a:schemeClr val="accent1"/>
+            </a:fillRef>
+            <a:effectRef idx="0">
+              <a:schemeClr val="accent1"/>
+            </a:effectRef>
+            <a:fontRef idx="minor">
+              <a:schemeClr val="tx1"/>
+            </a:fontRef>
+          </p:style>
+        </p:cxnSp>
+      </p:grpSp>
+      <p:grpSp>
+        <p:nvGrpSpPr>
+          <p:cNvPr id="9" name="Group 8">
+            <a:extLst>
+              <a:ext uri="{FF2B5EF4-FFF2-40B4-BE49-F238E27FC236}">
+                <a16:creationId xmlns:a16="http://schemas.microsoft.com/office/drawing/2014/main" id="{5E5E0DD9-55A0-402F-BEA7-6F402B8262F6}"/>
+              </a:ext>
+            </a:extLst>
+          </p:cNvPr>
+          <p:cNvGrpSpPr/>
+          <p:nvPr/>
+        </p:nvGrpSpPr>
+        <p:grpSpPr>
+          <a:xfrm>
+            <a:off x="6287678" y="3538250"/>
+            <a:ext cx="461386" cy="369332"/>
+            <a:chOff x="5322881" y="3429000"/>
+            <a:chExt cx="461386" cy="369332"/>
+          </a:xfrm>
+        </p:grpSpPr>
+        <p:sp>
+          <p:nvSpPr>
+            <p:cNvPr id="10" name="TextBox 9">
+              <a:extLst>
+                <a:ext uri="{FF2B5EF4-FFF2-40B4-BE49-F238E27FC236}">
+                  <a16:creationId xmlns:a16="http://schemas.microsoft.com/office/drawing/2014/main" id="{366F7E8E-0606-4A92-8D4D-57C63540A890}"/>
+                </a:ext>
+              </a:extLst>
+            </p:cNvPr>
+            <p:cNvSpPr txBox="1"/>
+            <p:nvPr/>
+          </p:nvSpPr>
+          <p:spPr>
+            <a:xfrm>
+              <a:off x="5477773" y="3429000"/>
+              <a:ext cx="306494" cy="369332"/>
+            </a:xfrm>
+            <a:prstGeom prst="rect">
+              <a:avLst/>
+            </a:prstGeom>
+            <a:noFill/>
+          </p:spPr>
+          <p:txBody>
+            <a:bodyPr wrap="none" rtlCol="0">
+              <a:spAutoFit/>
+            </a:bodyPr>
+            <a:lstStyle/>
+            <a:p>
+              <a:r>
+                <a:rPr lang="en-US" i="1" dirty="0"/>
+                <a:t>b</a:t>
+              </a:r>
+            </a:p>
+          </p:txBody>
+        </p:sp>
+        <p:cxnSp>
+          <p:nvCxnSpPr>
+            <p:cNvPr id="11" name="Straight Arrow Connector 10">
+              <a:extLst>
+                <a:ext uri="{FF2B5EF4-FFF2-40B4-BE49-F238E27FC236}">
+                  <a16:creationId xmlns:a16="http://schemas.microsoft.com/office/drawing/2014/main" id="{BDFCF6DB-5505-4BA9-B2D5-096DAD1AE9BA}"/>
+                </a:ext>
+              </a:extLst>
+            </p:cNvPr>
+            <p:cNvCxnSpPr>
+              <a:cxnSpLocks/>
+              <a:stCxn id="10" idx="1"/>
+            </p:cNvCxnSpPr>
+            <p:nvPr/>
+          </p:nvCxnSpPr>
+          <p:spPr>
+            <a:xfrm flipH="1" flipV="1">
+              <a:off x="5322881" y="3429000"/>
+              <a:ext cx="154892" cy="184666"/>
+            </a:xfrm>
+            <a:prstGeom prst="straightConnector1">
+              <a:avLst/>
+            </a:prstGeom>
+            <a:ln>
+              <a:solidFill>
+                <a:schemeClr val="tx1"/>
+              </a:solidFill>
+              <a:tailEnd type="stealth"/>
+            </a:ln>
+          </p:spPr>
+          <p:style>
+            <a:lnRef idx="1">
+              <a:schemeClr val="accent1"/>
+            </a:lnRef>
+            <a:fillRef idx="0">
+              <a:schemeClr val="accent1"/>
+            </a:fillRef>
+            <a:effectRef idx="0">
+              <a:schemeClr val="accent1"/>
+            </a:effectRef>
+            <a:fontRef idx="minor">
+              <a:schemeClr val="tx1"/>
+            </a:fontRef>
+          </p:style>
+        </p:cxnSp>
+      </p:grpSp>
+      <p:sp>
+        <p:nvSpPr>
+          <p:cNvPr id="15" name="TextBox 14">
+            <a:extLst>
+              <a:ext uri="{FF2B5EF4-FFF2-40B4-BE49-F238E27FC236}">
+                <a16:creationId xmlns:a16="http://schemas.microsoft.com/office/drawing/2014/main" id="{68771EDA-C256-4040-BDC7-4D15FB4C1837}"/>
+              </a:ext>
+            </a:extLst>
+          </p:cNvPr>
+          <p:cNvSpPr txBox="1"/>
+          <p:nvPr/>
+        </p:nvSpPr>
+        <p:spPr>
+          <a:xfrm>
+            <a:off x="3459637" y="5740924"/>
+            <a:ext cx="3752117" cy="369332"/>
+          </a:xfrm>
+          <a:prstGeom prst="rect">
+            <a:avLst/>
+          </a:prstGeom>
+          <a:noFill/>
+          <a:ln>
+            <a:solidFill>
+              <a:schemeClr val="tx1"/>
+            </a:solidFill>
+          </a:ln>
+        </p:spPr>
+        <p:txBody>
+          <a:bodyPr wrap="none" rtlCol="0">
+            <a:spAutoFit/>
+          </a:bodyPr>
+          <a:lstStyle/>
+          <a:p>
+            <a:r>
+              <a:rPr lang="en-US" dirty="0"/>
+              <a:t>Fuzzy union between edges: </a:t>
+            </a:r>
+            <a:r>
+              <a:rPr lang="en-US" i="1" dirty="0"/>
+              <a:t>a</a:t>
+            </a:r>
+            <a:r>
+              <a:rPr lang="en-US" dirty="0"/>
+              <a:t> + </a:t>
+            </a:r>
+            <a:r>
+              <a:rPr lang="en-US" i="1" dirty="0"/>
+              <a:t>b</a:t>
+            </a:r>
+            <a:r>
+              <a:rPr lang="en-US" dirty="0"/>
+              <a:t> - </a:t>
+            </a:r>
+            <a:r>
+              <a:rPr lang="en-US" i="1" dirty="0"/>
+              <a:t>ab</a:t>
+            </a:r>
+          </a:p>
+        </p:txBody>
+      </p:sp>
+    </p:spTree>
+    <p:extLst>
+      <p:ext uri="{BB962C8B-B14F-4D97-AF65-F5344CB8AC3E}">
+        <p14:creationId xmlns:p14="http://schemas.microsoft.com/office/powerpoint/2010/main" val="1974564690"/>
+      </p:ext>
+    </p:extLst>
+  </p:cSld>
+  <p:clrMapOvr>
+    <a:masterClrMapping/>
+  </p:clrMapOvr>
+</p:sld>
+</file>
+
+<file path=ppt/slides/slide18.xml><?xml version="1.0" encoding="utf-8"?>
+<p:sld xmlns:a="http://schemas.openxmlformats.org/drawingml/2006/main" xmlns:r="http://schemas.openxmlformats.org/officeDocument/2006/relationships" xmlns:p="http://schemas.openxmlformats.org/presentationml/2006/main">
+  <p:cSld>
+    <p:spTree>
+      <p:nvGrpSpPr>
+        <p:cNvPr id="1" name=""/>
+        <p:cNvGrpSpPr/>
+        <p:nvPr/>
+      </p:nvGrpSpPr>
+      <p:grpSpPr>
+        <a:xfrm>
+          <a:off x="0" y="0"/>
+          <a:ext cx="0" cy="0"/>
+          <a:chOff x="0" y="0"/>
+          <a:chExt cx="0" cy="0"/>
+        </a:xfrm>
+      </p:grpSpPr>
+      <p:sp>
+        <p:nvSpPr>
+          <p:cNvPr id="2" name="Title 1">
+            <a:extLst>
+              <a:ext uri="{FF2B5EF4-FFF2-40B4-BE49-F238E27FC236}">
+                <a16:creationId xmlns:a16="http://schemas.microsoft.com/office/drawing/2014/main" id="{267113E7-D43C-408F-8944-FCC78EC6EED9}"/>
+              </a:ext>
+            </a:extLst>
+          </p:cNvPr>
+          <p:cNvSpPr>
+            <a:spLocks noGrp="1"/>
+          </p:cNvSpPr>
+          <p:nvPr>
+            <p:ph type="title"/>
+          </p:nvPr>
+        </p:nvSpPr>
+        <p:spPr/>
+        <p:txBody>
+          <a:bodyPr/>
+          <a:lstStyle/>
+          <a:p>
+            <a:r>
+              <a:rPr lang="en-US" dirty="0"/>
+              <a:t>Final high-dimensional representation</a:t>
+            </a:r>
+          </a:p>
+        </p:txBody>
+      </p:sp>
+      <p:pic>
+        <p:nvPicPr>
+          <p:cNvPr id="4098" name="Picture 2" descr="Graph with combined edge weights">
+            <a:extLst>
+              <a:ext uri="{FF2B5EF4-FFF2-40B4-BE49-F238E27FC236}">
+                <a16:creationId xmlns:a16="http://schemas.microsoft.com/office/drawing/2014/main" id="{F63E5BB2-7A2F-4FA2-BA0D-E24364E33F28}"/>
+              </a:ext>
+            </a:extLst>
+          </p:cNvPr>
+          <p:cNvPicPr>
+            <a:picLocks noChangeAspect="1" noChangeArrowheads="1"/>
+          </p:cNvPicPr>
+          <p:nvPr/>
+        </p:nvPicPr>
+        <p:blipFill>
+          <a:blip r:embed="rId2">
+            <a:extLst>
+              <a:ext uri="{28A0092B-C50C-407E-A947-70E740481C1C}">
+                <a14:useLocalDpi xmlns:a14="http://schemas.microsoft.com/office/drawing/2010/main" val="0"/>
+              </a:ext>
+            </a:extLst>
+          </a:blip>
+          <a:srcRect/>
+          <a:stretch>
+            <a:fillRect/>
+          </a:stretch>
+        </p:blipFill>
+        <p:spPr bwMode="auto">
+          <a:xfrm>
+            <a:off x="2843213" y="1562100"/>
+            <a:ext cx="6505575" cy="3733800"/>
+          </a:xfrm>
+          <a:prstGeom prst="rect">
+            <a:avLst/>
+          </a:prstGeom>
+          <a:noFill/>
+          <a:extLst>
+            <a:ext uri="{909E8E84-426E-40DD-AFC4-6F175D3DCCD1}">
+              <a14:hiddenFill xmlns:a14="http://schemas.microsoft.com/office/drawing/2010/main">
+                <a:solidFill>
+                  <a:srgbClr val="FFFFFF"/>
+                </a:solidFill>
+              </a14:hiddenFill>
+            </a:ext>
+          </a:extLst>
+        </p:spPr>
+      </p:pic>
+    </p:spTree>
+    <p:extLst>
+      <p:ext uri="{BB962C8B-B14F-4D97-AF65-F5344CB8AC3E}">
+        <p14:creationId xmlns:p14="http://schemas.microsoft.com/office/powerpoint/2010/main" val="1487928344"/>
+      </p:ext>
+    </p:extLst>
+  </p:cSld>
+  <p:clrMapOvr>
+    <a:masterClrMapping/>
+  </p:clrMapOvr>
+</p:sld>
+</file>
+
+<file path=ppt/slides/slide19.xml><?xml version="1.0" encoding="utf-8"?>
+<p:sld xmlns:a="http://schemas.openxmlformats.org/drawingml/2006/main" xmlns:r="http://schemas.openxmlformats.org/officeDocument/2006/relationships" xmlns:p="http://schemas.openxmlformats.org/presentationml/2006/main">
+  <p:cSld>
+    <p:spTree>
+      <p:nvGrpSpPr>
+        <p:cNvPr id="1" name=""/>
+        <p:cNvGrpSpPr/>
+        <p:nvPr/>
+      </p:nvGrpSpPr>
+      <p:grpSpPr>
+        <a:xfrm>
+          <a:off x="0" y="0"/>
+          <a:ext cx="0" cy="0"/>
+          <a:chOff x="0" y="0"/>
+          <a:chExt cx="0" cy="0"/>
+        </a:xfrm>
+      </p:grpSpPr>
+      <p:sp>
+        <p:nvSpPr>
+          <p:cNvPr id="2" name="Title 1">
+            <a:extLst>
+              <a:ext uri="{FF2B5EF4-FFF2-40B4-BE49-F238E27FC236}">
+                <a16:creationId xmlns:a16="http://schemas.microsoft.com/office/drawing/2014/main" id="{D744D78F-D2A4-4269-A883-9F758505E1A5}"/>
+              </a:ext>
+            </a:extLst>
+          </p:cNvPr>
+          <p:cNvSpPr>
+            <a:spLocks noGrp="1"/>
+          </p:cNvSpPr>
+          <p:nvPr>
+            <p:ph type="title"/>
+          </p:nvPr>
+        </p:nvSpPr>
+        <p:spPr/>
+        <p:txBody>
+          <a:bodyPr/>
+          <a:lstStyle/>
+          <a:p>
+            <a:r>
+              <a:rPr lang="en-US" dirty="0"/>
+              <a:t>To a low-dimensional representation</a:t>
+            </a:r>
+          </a:p>
+        </p:txBody>
+      </p:sp>
+      <p:sp>
+        <p:nvSpPr>
+          <p:cNvPr id="3" name="Content Placeholder 2">
+            <a:extLst>
+              <a:ext uri="{FF2B5EF4-FFF2-40B4-BE49-F238E27FC236}">
+                <a16:creationId xmlns:a16="http://schemas.microsoft.com/office/drawing/2014/main" id="{60FAEB9F-8C3B-48BA-869D-AB32A5583E29}"/>
+              </a:ext>
+            </a:extLst>
+          </p:cNvPr>
+          <p:cNvSpPr>
+            <a:spLocks noGrp="1"/>
+          </p:cNvSpPr>
+          <p:nvPr>
+            <p:ph idx="1"/>
+          </p:nvPr>
+        </p:nvSpPr>
+        <p:spPr/>
+        <p:txBody>
+          <a:bodyPr/>
+          <a:lstStyle/>
+          <a:p>
+            <a:r>
+              <a:rPr lang="en-US" dirty="0"/>
+              <a:t>What?</a:t>
+            </a:r>
+          </a:p>
+          <a:p>
+            <a:pPr lvl="1"/>
+            <a:r>
+              <a:rPr lang="en-US" dirty="0"/>
+              <a:t>Fuzzy topological structure of data (same as in high-dimensional space)</a:t>
+            </a:r>
+          </a:p>
+          <a:p>
+            <a:pPr lvl="2"/>
+            <a:r>
+              <a:rPr lang="en-US" dirty="0"/>
+              <a:t>"Normal" Euclidian metric</a:t>
+            </a:r>
+          </a:p>
+          <a:p>
+            <a:pPr lvl="2"/>
+            <a:r>
+              <a:rPr lang="en-US" dirty="0"/>
+              <a:t>Distance preservation</a:t>
+            </a:r>
+          </a:p>
+          <a:p>
+            <a:r>
+              <a:rPr lang="en-US" dirty="0"/>
+              <a:t>How?</a:t>
+            </a:r>
+          </a:p>
+          <a:p>
+            <a:pPr lvl="1"/>
+            <a:r>
+              <a:rPr lang="en-US" dirty="0"/>
+              <a:t>Minimize cross-entropy for 1-simplices </a:t>
+            </a:r>
+            <a:r>
+              <a:rPr lang="en-US" i="1" dirty="0"/>
+              <a:t>E</a:t>
+            </a:r>
+          </a:p>
+          <a:p>
+            <a:pPr lvl="1"/>
+            <a:endParaRPr lang="en-US" dirty="0"/>
+          </a:p>
+        </p:txBody>
+      </p:sp>
+      <p:pic>
+        <p:nvPicPr>
+          <p:cNvPr id="5" name="Picture 4">
+            <a:extLst>
+              <a:ext uri="{FF2B5EF4-FFF2-40B4-BE49-F238E27FC236}">
+                <a16:creationId xmlns:a16="http://schemas.microsoft.com/office/drawing/2014/main" id="{1D87800D-7C9B-4D32-8344-47E931A62E55}"/>
+              </a:ext>
+            </a:extLst>
+          </p:cNvPr>
+          <p:cNvPicPr>
+            <a:picLocks noChangeAspect="1"/>
+          </p:cNvPicPr>
+          <p:nvPr/>
+        </p:nvPicPr>
+        <p:blipFill>
+          <a:blip r:embed="rId2"/>
+          <a:stretch>
+            <a:fillRect/>
+          </a:stretch>
+        </p:blipFill>
+        <p:spPr>
+          <a:xfrm>
+            <a:off x="2127131" y="4397217"/>
+            <a:ext cx="5449060" cy="857370"/>
+          </a:xfrm>
+          <a:prstGeom prst="rect">
+            <a:avLst/>
+          </a:prstGeom>
+        </p:spPr>
+      </p:pic>
+      <p:sp>
+        <p:nvSpPr>
+          <p:cNvPr id="4" name="TextBox 3">
+            <a:extLst>
+              <a:ext uri="{FF2B5EF4-FFF2-40B4-BE49-F238E27FC236}">
+                <a16:creationId xmlns:a16="http://schemas.microsoft.com/office/drawing/2014/main" id="{C2FD1318-1FAC-4851-BB77-02C8964A255C}"/>
+              </a:ext>
+            </a:extLst>
+          </p:cNvPr>
+          <p:cNvSpPr txBox="1"/>
+          <p:nvPr/>
+        </p:nvSpPr>
+        <p:spPr>
+          <a:xfrm>
+            <a:off x="4662723" y="3105509"/>
+            <a:ext cx="2866554" cy="369332"/>
+          </a:xfrm>
+          <a:prstGeom prst="rect">
+            <a:avLst/>
+          </a:prstGeom>
+          <a:noFill/>
+          <a:ln>
+            <a:solidFill>
+              <a:schemeClr val="tx1"/>
+            </a:solidFill>
+          </a:ln>
+        </p:spPr>
+        <p:txBody>
+          <a:bodyPr wrap="none" rtlCol="0">
+            <a:spAutoFit/>
+          </a:bodyPr>
+          <a:lstStyle/>
+          <a:p>
+            <a:r>
+              <a:rPr lang="en-US" dirty="0" err="1">
+                <a:latin typeface="Courier New" panose="02070309020205020404" pitchFamily="49" charset="0"/>
+                <a:cs typeface="Courier New" panose="02070309020205020404" pitchFamily="49" charset="0"/>
+              </a:rPr>
+              <a:t>min_dist</a:t>
+            </a:r>
+            <a:r>
+              <a:rPr lang="en-US" dirty="0"/>
+              <a:t> hyperparameter</a:t>
+            </a:r>
+          </a:p>
+        </p:txBody>
+      </p:sp>
+    </p:spTree>
+    <p:extLst>
+      <p:ext uri="{BB962C8B-B14F-4D97-AF65-F5344CB8AC3E}">
+        <p14:creationId xmlns:p14="http://schemas.microsoft.com/office/powerpoint/2010/main" val="1813797133"/>
+      </p:ext>
+    </p:extLst>
+  </p:cSld>
+  <p:clrMapOvr>
+    <a:masterClrMapping/>
+  </p:clrMapOvr>
+  <p:timing>
+    <p:tnLst>
+      <p:par>
+        <p:cTn id="1" dur="indefinite" restart="never" nodeType="tmRoot">
+          <p:childTnLst>
+            <p:seq concurrent="1" nextAc="seek">
+              <p:cTn id="2" dur="indefinite" nodeType="mainSeq">
+                <p:childTnLst>
+                  <p:par>
+                    <p:cTn id="3" fill="hold">
+                      <p:stCondLst>
+                        <p:cond delay="indefinite"/>
+                        <p:cond evt="onBegin" delay="0">
+                          <p:tn val="2"/>
+                        </p:cond>
+                      </p:stCondLst>
+                      <p:childTnLst>
+                        <p:par>
+                          <p:cTn id="4" fill="hold">
+                            <p:stCondLst>
+                              <p:cond delay="0"/>
+                            </p:stCondLst>
+                            <p:childTnLst>
+                              <p:par>
+                                <p:cTn id="5" presetID="1" presetClass="entr" presetSubtype="0" fill="hold" grpId="0" nodeType="withEffect">
+                                  <p:stCondLst>
+                                    <p:cond delay="0"/>
+                                  </p:stCondLst>
+                                  <p:childTnLst>
+                                    <p:set>
+                                      <p:cBhvr>
+                                        <p:cTn id="6" dur="1" fill="hold">
+                                          <p:stCondLst>
+                                            <p:cond delay="0"/>
+                                          </p:stCondLst>
+                                        </p:cTn>
+                                        <p:tgtEl>
+                                          <p:spTgt spid="3">
+                                            <p:txEl>
+                                              <p:pRg st="0" end="0"/>
+                                            </p:txEl>
+                                          </p:spTgt>
+                                        </p:tgtEl>
+                                        <p:attrNameLst>
+                                          <p:attrName>style.visibility</p:attrName>
+                                        </p:attrNameLst>
+                                      </p:cBhvr>
+                                      <p:to>
+                                        <p:strVal val="visible"/>
+                                      </p:to>
+                                    </p:set>
+                                  </p:childTnLst>
+                                </p:cTn>
+                              </p:par>
+                              <p:par>
+                                <p:cTn id="7" presetID="1" presetClass="entr" presetSubtype="0" fill="hold" grpId="0" nodeType="withEffect">
+                                  <p:stCondLst>
+                                    <p:cond delay="0"/>
+                                  </p:stCondLst>
+                                  <p:childTnLst>
+                                    <p:set>
+                                      <p:cBhvr>
+                                        <p:cTn id="8" dur="1" fill="hold">
+                                          <p:stCondLst>
+                                            <p:cond delay="0"/>
+                                          </p:stCondLst>
+                                        </p:cTn>
+                                        <p:tgtEl>
+                                          <p:spTgt spid="3">
+                                            <p:txEl>
+                                              <p:pRg st="1" end="1"/>
+                                            </p:txEl>
+                                          </p:spTgt>
+                                        </p:tgtEl>
+                                        <p:attrNameLst>
+                                          <p:attrName>style.visibility</p:attrName>
+                                        </p:attrNameLst>
+                                      </p:cBhvr>
+                                      <p:to>
+                                        <p:strVal val="visible"/>
+                                      </p:to>
+                                    </p:set>
+                                  </p:childTnLst>
+                                </p:cTn>
+                              </p:par>
+                              <p:par>
+                                <p:cTn id="9" presetID="1" presetClass="entr" presetSubtype="0" fill="hold" grpId="0" nodeType="withEffect">
+                                  <p:stCondLst>
+                                    <p:cond delay="0"/>
+                                  </p:stCondLst>
+                                  <p:childTnLst>
+                                    <p:set>
+                                      <p:cBhvr>
+                                        <p:cTn id="10" dur="1" fill="hold">
+                                          <p:stCondLst>
+                                            <p:cond delay="0"/>
+                                          </p:stCondLst>
+                                        </p:cTn>
+                                        <p:tgtEl>
+                                          <p:spTgt spid="3">
+                                            <p:txEl>
+                                              <p:pRg st="2" end="2"/>
+                                            </p:txEl>
+                                          </p:spTgt>
+                                        </p:tgtEl>
+                                        <p:attrNameLst>
+                                          <p:attrName>style.visibility</p:attrName>
+                                        </p:attrNameLst>
+                                      </p:cBhvr>
+                                      <p:to>
+                                        <p:strVal val="visible"/>
+                                      </p:to>
+                                    </p:set>
+                                  </p:childTnLst>
+                                </p:cTn>
+                              </p:par>
+                              <p:par>
+                                <p:cTn id="11" presetID="1" presetClass="entr" presetSubtype="0" fill="hold" grpId="0" nodeType="withEffect">
+                                  <p:stCondLst>
+                                    <p:cond delay="0"/>
+                                  </p:stCondLst>
+                                  <p:childTnLst>
+                                    <p:set>
+                                      <p:cBhvr>
+                                        <p:cTn id="12" dur="1" fill="hold">
+                                          <p:stCondLst>
+                                            <p:cond delay="0"/>
+                                          </p:stCondLst>
+                                        </p:cTn>
+                                        <p:tgtEl>
+                                          <p:spTgt spid="3">
+                                            <p:txEl>
+                                              <p:pRg st="3" end="3"/>
+                                            </p:txEl>
+                                          </p:spTgt>
+                                        </p:tgtEl>
+                                        <p:attrNameLst>
+                                          <p:attrName>style.visibility</p:attrName>
+                                        </p:attrNameLst>
+                                      </p:cBhvr>
+                                      <p:to>
+                                        <p:strVal val="visible"/>
+                                      </p:to>
+                                    </p:set>
+                                  </p:childTnLst>
+                                </p:cTn>
+                              </p:par>
+                            </p:childTnLst>
+                          </p:cTn>
+                        </p:par>
+                      </p:childTnLst>
+                    </p:cTn>
+                  </p:par>
+                  <p:par>
+                    <p:cTn id="13" fill="hold">
+                      <p:stCondLst>
+                        <p:cond delay="indefinite"/>
+                      </p:stCondLst>
+                      <p:childTnLst>
+                        <p:par>
+                          <p:cTn id="14" fill="hold">
+                            <p:stCondLst>
+                              <p:cond delay="0"/>
+                            </p:stCondLst>
+                            <p:childTnLst>
+                              <p:par>
+                                <p:cTn id="15" presetID="1" presetClass="entr" presetSubtype="0" fill="hold" grpId="0" nodeType="clickEffect">
+                                  <p:stCondLst>
+                                    <p:cond delay="0"/>
+                                  </p:stCondLst>
+                                  <p:childTnLst>
+                                    <p:set>
+                                      <p:cBhvr>
+                                        <p:cTn id="16" dur="1" fill="hold">
+                                          <p:stCondLst>
+                                            <p:cond delay="0"/>
+                                          </p:stCondLst>
+                                        </p:cTn>
+                                        <p:tgtEl>
+                                          <p:spTgt spid="3">
+                                            <p:txEl>
+                                              <p:pRg st="4" end="4"/>
+                                            </p:txEl>
+                                          </p:spTgt>
+                                        </p:tgtEl>
+                                        <p:attrNameLst>
+                                          <p:attrName>style.visibility</p:attrName>
+                                        </p:attrNameLst>
+                                      </p:cBhvr>
+                                      <p:to>
+                                        <p:strVal val="visible"/>
+                                      </p:to>
+                                    </p:set>
+                                  </p:childTnLst>
+                                </p:cTn>
+                              </p:par>
+                              <p:par>
+                                <p:cTn id="17" presetID="1" presetClass="entr" presetSubtype="0" fill="hold" grpId="0" nodeType="withEffect">
+                                  <p:stCondLst>
+                                    <p:cond delay="0"/>
+                                  </p:stCondLst>
+                                  <p:childTnLst>
+                                    <p:set>
+                                      <p:cBhvr>
+                                        <p:cTn id="18" dur="1" fill="hold">
+                                          <p:stCondLst>
+                                            <p:cond delay="0"/>
+                                          </p:stCondLst>
+                                        </p:cTn>
+                                        <p:tgtEl>
+                                          <p:spTgt spid="3">
+                                            <p:txEl>
+                                              <p:pRg st="5" end="5"/>
+                                            </p:txEl>
+                                          </p:spTgt>
+                                        </p:tgtEl>
+                                        <p:attrNameLst>
+                                          <p:attrName>style.visibility</p:attrName>
+                                        </p:attrNameLst>
+                                      </p:cBhvr>
+                                      <p:to>
+                                        <p:strVal val="visible"/>
+                                      </p:to>
+                                    </p:set>
+                                  </p:childTnLst>
+                                </p:cTn>
+                              </p:par>
+                            </p:childTnLst>
+                          </p:cTn>
+                        </p:par>
+                      </p:childTnLst>
+                    </p:cTn>
+                  </p:par>
+                </p:childTnLst>
+              </p:cTn>
+              <p:prevCondLst>
+                <p:cond evt="onPrev" delay="0">
+                  <p:tgtEl>
+                    <p:sldTgt/>
+                  </p:tgtEl>
+                </p:cond>
+              </p:prevCondLst>
+              <p:nextCondLst>
+                <p:cond evt="onNext" delay="0">
+                  <p:tgtEl>
+                    <p:sldTgt/>
+                  </p:tgtEl>
+                </p:cond>
+              </p:nextCondLst>
+            </p:seq>
+          </p:childTnLst>
+        </p:cTn>
+      </p:par>
+    </p:tnLst>
+    <p:bldLst>
+      <p:bldP spid="3" grpId="0" uiExpand="1" build="p"/>
+    </p:bldLst>
+  </p:timing>
 </p:sld>
 </file>
 

</xml_diff>